<commit_message>
Un petit peu plus
</commit_message>
<xml_diff>
--- a/PreparationOral/PreparationOral.pptx
+++ b/PreparationOral/PreparationOral.pptx
@@ -213,7 +213,7 @@
             <a:fld id="{E494A05E-DEA9-4CEA-A63B-3593EEF3AC45}" type="datetimeFigureOut">
               <a:rPr lang="fr-FR" smtClean="0"/>
               <a:pPr/>
-              <a:t>13/05/2018</a:t>
+              <a:t>14/05/2018</a:t>
             </a:fld>
             <a:endParaRPr lang="fr-FR"/>
           </a:p>
@@ -1140,7 +1140,7 @@
             <a:fld id="{3A961F90-11F6-4966-B0E5-2BB20F714B78}" type="datetime1">
               <a:rPr lang="fr-FR" smtClean="0"/>
               <a:pPr/>
-              <a:t>13/05/2018</a:t>
+              <a:t>14/05/2018</a:t>
             </a:fld>
             <a:endParaRPr lang="fr-FR"/>
           </a:p>
@@ -1501,7 +1501,7 @@
             <a:fld id="{59700BD1-A4B5-444B-B773-B4FDD97DF200}" type="datetime1">
               <a:rPr lang="fr-FR" smtClean="0"/>
               <a:pPr/>
-              <a:t>13/05/2018</a:t>
+              <a:t>14/05/2018</a:t>
             </a:fld>
             <a:endParaRPr lang="fr-FR"/>
           </a:p>
@@ -1678,7 +1678,7 @@
             <a:fld id="{A354AF49-C35E-40F6-8345-CA866716EE79}" type="datetime1">
               <a:rPr lang="fr-FR" smtClean="0"/>
               <a:pPr/>
-              <a:t>13/05/2018</a:t>
+              <a:t>14/05/2018</a:t>
             </a:fld>
             <a:endParaRPr lang="fr-FR"/>
           </a:p>
@@ -1920,7 +1920,7 @@
             <a:fld id="{EAFEF7E1-4A71-4560-AA4D-33BBAAF32357}" type="datetime1">
               <a:rPr lang="fr-FR" smtClean="0"/>
               <a:pPr/>
-              <a:t>13/05/2018</a:t>
+              <a:t>14/05/2018</a:t>
             </a:fld>
             <a:endParaRPr lang="fr-FR"/>
           </a:p>
@@ -2191,7 +2191,7 @@
             <a:fld id="{9BE6CECE-C4BA-493A-9F45-8F69D8200EC9}" type="datetime1">
               <a:rPr lang="fr-FR" smtClean="0"/>
               <a:pPr/>
-              <a:t>13/05/2018</a:t>
+              <a:t>14/05/2018</a:t>
             </a:fld>
             <a:endParaRPr lang="fr-FR"/>
           </a:p>
@@ -2413,7 +2413,7 @@
             <a:fld id="{6B400324-51BB-4021-B482-6C084AB66459}" type="datetime1">
               <a:rPr lang="fr-FR" smtClean="0"/>
               <a:pPr/>
-              <a:t>13/05/2018</a:t>
+              <a:t>14/05/2018</a:t>
             </a:fld>
             <a:endParaRPr lang="fr-FR"/>
           </a:p>
@@ -2767,7 +2767,7 @@
             <a:fld id="{87C4A39B-E1E0-4B19-A965-1E1097FB3AF3}" type="datetime1">
               <a:rPr lang="fr-FR" smtClean="0"/>
               <a:pPr/>
-              <a:t>13/05/2018</a:t>
+              <a:t>14/05/2018</a:t>
             </a:fld>
             <a:endParaRPr lang="fr-FR"/>
           </a:p>
@@ -3001,7 +3001,7 @@
             <a:fld id="{CEF5A761-699F-4B94-BA43-1E8C0C9C554B}" type="datetime1">
               <a:rPr lang="fr-FR" smtClean="0"/>
               <a:pPr/>
-              <a:t>13/05/2018</a:t>
+              <a:t>14/05/2018</a:t>
             </a:fld>
             <a:endParaRPr lang="fr-FR"/>
           </a:p>
@@ -3143,7 +3143,7 @@
             <a:fld id="{E407DE65-0759-4C9C-9804-8C4C0AC5F8D7}" type="datetime1">
               <a:rPr lang="fr-FR" smtClean="0"/>
               <a:pPr/>
-              <a:t>13/05/2018</a:t>
+              <a:t>14/05/2018</a:t>
             </a:fld>
             <a:endParaRPr lang="fr-FR"/>
           </a:p>
@@ -3422,7 +3422,7 @@
             <a:fld id="{6DCAF433-E5EB-4B74-B8BB-3F6D9EEAE800}" type="datetime1">
               <a:rPr lang="fr-FR" smtClean="0"/>
               <a:pPr/>
-              <a:t>13/05/2018</a:t>
+              <a:t>14/05/2018</a:t>
             </a:fld>
             <a:endParaRPr lang="fr-FR"/>
           </a:p>
@@ -3831,7 +3831,7 @@
             <a:fld id="{E5AEAC06-18E9-471A-B77A-CDA5C363BF1F}" type="datetime1">
               <a:rPr lang="fr-FR" smtClean="0"/>
               <a:pPr/>
-              <a:t>13/05/2018</a:t>
+              <a:t>14/05/2018</a:t>
             </a:fld>
             <a:endParaRPr lang="fr-FR"/>
           </a:p>
@@ -4171,7 +4171,7 @@
             <a:fld id="{B9178431-C703-4FD6-9F6F-E8F5512852E2}" type="datetime1">
               <a:rPr lang="fr-FR" smtClean="0"/>
               <a:pPr/>
-              <a:t>13/05/2018</a:t>
+              <a:t>14/05/2018</a:t>
             </a:fld>
             <a:endParaRPr lang="fr-FR"/>
           </a:p>
@@ -6259,7 +6259,6 @@
               <a:rPr lang="fr-FR" dirty="0"/>
               <a:t>un modèle en fonction d’observations et de mesures effectuées sur le système réel.</a:t>
             </a:r>
-            <a:endParaRPr lang="fr-FR" dirty="0"/>
           </a:p>
         </p:txBody>
       </p:sp>
@@ -6983,8 +6982,20 @@
           <a:p>
             <a:r>
               <a:rPr lang="fr-FR" dirty="0" smtClean="0"/>
-              <a:t>Soutenances à voir selon planning.</a:t>
-            </a:r>
+              <a:t>Soutenances à voir selon planning</a:t>
+            </a:r>
+            <a:r>
+              <a:rPr lang="fr-FR" dirty="0" smtClean="0"/>
+              <a:t>.</a:t>
+            </a:r>
+          </a:p>
+          <a:p>
+            <a:pPr lvl="1"/>
+            <a:r>
+              <a:rPr lang="fr-FR" b="1" dirty="0" smtClean="0"/>
+              <a:t>Présentation à fournir 48h avant la présentation </a:t>
+            </a:r>
+            <a:endParaRPr lang="fr-FR" b="1" dirty="0" smtClean="0"/>
           </a:p>
           <a:p>
             <a:endParaRPr lang="fr-FR" dirty="0"/>
@@ -7245,13 +7256,8 @@
           <a:p>
             <a:r>
               <a:rPr lang="fr-FR" dirty="0" smtClean="0"/>
-              <a:t>Concours </a:t>
-            </a:r>
-            <a:r>
-              <a:rPr lang="fr-FR" dirty="0" smtClean="0"/>
-              <a:t>E3A 4h ?</a:t>
-            </a:r>
-            <a:endParaRPr lang="fr-FR" dirty="0" smtClean="0"/>
+              <a:t>Concours E3A 4h ?</a:t>
+            </a:r>
           </a:p>
           <a:p>
             <a:endParaRPr lang="fr-FR" dirty="0"/>
@@ -8411,11 +8417,7 @@
           <a:p>
             <a:r>
               <a:rPr lang="fr-FR" dirty="0" smtClean="0"/>
-              <a:t>Conseils </a:t>
-            </a:r>
-            <a:r>
-              <a:rPr lang="fr-FR" dirty="0" smtClean="0"/>
-              <a:t>2018</a:t>
+              <a:t>Conseils 2018</a:t>
             </a:r>
           </a:p>
           <a:p>

</xml_diff>